<commit_message>
updated seizure type analysis to save odds and reran code
</commit_message>
<xml_diff>
--- a/updates/kiran/exploratory_seizure_types.pptx
+++ b/updates/kiran/exploratory_seizure_types.pptx
@@ -273,7 +273,7 @@
           <a:p>
             <a:fld id="{82799AEF-950D-854C-A1FD-1F081D0AA533}" type="datetimeFigureOut">
               <a:rPr lang="en-US" smtClean="0"/>
-              <a:t>6/4/2024</a:t>
+              <a:t>6/5/24</a:t>
             </a:fld>
             <a:endParaRPr lang="en-US"/>
           </a:p>
@@ -471,7 +471,7 @@
           <a:p>
             <a:fld id="{82799AEF-950D-854C-A1FD-1F081D0AA533}" type="datetimeFigureOut">
               <a:rPr lang="en-US" smtClean="0"/>
-              <a:t>6/4/2024</a:t>
+              <a:t>6/5/24</a:t>
             </a:fld>
             <a:endParaRPr lang="en-US"/>
           </a:p>
@@ -679,7 +679,7 @@
           <a:p>
             <a:fld id="{82799AEF-950D-854C-A1FD-1F081D0AA533}" type="datetimeFigureOut">
               <a:rPr lang="en-US" smtClean="0"/>
-              <a:t>6/4/2024</a:t>
+              <a:t>6/5/24</a:t>
             </a:fld>
             <a:endParaRPr lang="en-US"/>
           </a:p>
@@ -877,7 +877,7 @@
           <a:p>
             <a:fld id="{82799AEF-950D-854C-A1FD-1F081D0AA533}" type="datetimeFigureOut">
               <a:rPr lang="en-US" smtClean="0"/>
-              <a:t>6/4/2024</a:t>
+              <a:t>6/5/24</a:t>
             </a:fld>
             <a:endParaRPr lang="en-US"/>
           </a:p>
@@ -1152,7 +1152,7 @@
           <a:p>
             <a:fld id="{82799AEF-950D-854C-A1FD-1F081D0AA533}" type="datetimeFigureOut">
               <a:rPr lang="en-US" smtClean="0"/>
-              <a:t>6/4/2024</a:t>
+              <a:t>6/5/24</a:t>
             </a:fld>
             <a:endParaRPr lang="en-US"/>
           </a:p>
@@ -1417,7 +1417,7 @@
           <a:p>
             <a:fld id="{82799AEF-950D-854C-A1FD-1F081D0AA533}" type="datetimeFigureOut">
               <a:rPr lang="en-US" smtClean="0"/>
-              <a:t>6/4/2024</a:t>
+              <a:t>6/5/24</a:t>
             </a:fld>
             <a:endParaRPr lang="en-US"/>
           </a:p>
@@ -1829,7 +1829,7 @@
           <a:p>
             <a:fld id="{82799AEF-950D-854C-A1FD-1F081D0AA533}" type="datetimeFigureOut">
               <a:rPr lang="en-US" smtClean="0"/>
-              <a:t>6/4/2024</a:t>
+              <a:t>6/5/24</a:t>
             </a:fld>
             <a:endParaRPr lang="en-US"/>
           </a:p>
@@ -1970,7 +1970,7 @@
           <a:p>
             <a:fld id="{82799AEF-950D-854C-A1FD-1F081D0AA533}" type="datetimeFigureOut">
               <a:rPr lang="en-US" smtClean="0"/>
-              <a:t>6/4/2024</a:t>
+              <a:t>6/5/24</a:t>
             </a:fld>
             <a:endParaRPr lang="en-US"/>
           </a:p>
@@ -2083,7 +2083,7 @@
           <a:p>
             <a:fld id="{82799AEF-950D-854C-A1FD-1F081D0AA533}" type="datetimeFigureOut">
               <a:rPr lang="en-US" smtClean="0"/>
-              <a:t>6/4/2024</a:t>
+              <a:t>6/5/24</a:t>
             </a:fld>
             <a:endParaRPr lang="en-US"/>
           </a:p>
@@ -2394,7 +2394,7 @@
           <a:p>
             <a:fld id="{82799AEF-950D-854C-A1FD-1F081D0AA533}" type="datetimeFigureOut">
               <a:rPr lang="en-US" smtClean="0"/>
-              <a:t>6/4/2024</a:t>
+              <a:t>6/5/24</a:t>
             </a:fld>
             <a:endParaRPr lang="en-US"/>
           </a:p>
@@ -2682,7 +2682,7 @@
           <a:p>
             <a:fld id="{82799AEF-950D-854C-A1FD-1F081D0AA533}" type="datetimeFigureOut">
               <a:rPr lang="en-US" smtClean="0"/>
-              <a:t>6/4/2024</a:t>
+              <a:t>6/5/24</a:t>
             </a:fld>
             <a:endParaRPr lang="en-US"/>
           </a:p>
@@ -2923,7 +2923,7 @@
           <a:p>
             <a:fld id="{82799AEF-950D-854C-A1FD-1F081D0AA533}" type="datetimeFigureOut">
               <a:rPr lang="en-US" smtClean="0"/>
-              <a:t>6/4/2024</a:t>
+              <a:t>6/5/24</a:t>
             </a:fld>
             <a:endParaRPr lang="en-US"/>
           </a:p>
@@ -4685,7 +4685,7 @@
           <p:nvPr>
             <p:extLst>
               <p:ext uri="{D42A27DB-BD31-4B8C-83A1-F6EECF244321}">
-                <p14:modId xmlns:p14="http://schemas.microsoft.com/office/powerpoint/2010/main" val="4205757818"/>
+                <p14:modId xmlns:p14="http://schemas.microsoft.com/office/powerpoint/2010/main" val="3425962565"/>
               </p:ext>
             </p:extLst>
           </p:nvPr>
@@ -4884,10 +4884,7 @@
                     <a:bodyPr/>
                     <a:lstStyle/>
                     <a:p>
-                      <a:r>
-                        <a:rPr lang="en-US" sz="2300" dirty="0"/>
-                        <a:t>Not</a:t>
-                      </a:r>
+                      <a:endParaRPr lang="en-US" sz="2300" dirty="0"/>
                     </a:p>
                   </a:txBody>
                   <a:tcPr marL="116829" marR="116829" marT="58414" marB="58414"/>
@@ -5125,10 +5122,7 @@
                     <a:bodyPr/>
                     <a:lstStyle/>
                     <a:p>
-                      <a:r>
-                        <a:rPr lang="en-US" sz="2300" dirty="0"/>
-                        <a:t>Not</a:t>
-                      </a:r>
+                      <a:endParaRPr lang="en-US" sz="2300" dirty="0"/>
                     </a:p>
                   </a:txBody>
                   <a:tcPr marL="116829" marR="116829" marT="58414" marB="58414"/>
@@ -7669,7 +7663,7 @@
 </file>
 
 <file path=ppt/slides/slide6.xml><?xml version="1.0" encoding="utf-8"?>
-<p:sld xmlns:a="http://schemas.openxmlformats.org/drawingml/2006/main" xmlns:r="http://schemas.openxmlformats.org/officeDocument/2006/relationships" xmlns:p="http://schemas.openxmlformats.org/presentationml/2006/main">
+<p:sld xmlns:a="http://schemas.openxmlformats.org/drawingml/2006/main" xmlns:r="http://schemas.openxmlformats.org/officeDocument/2006/relationships" xmlns:p="http://schemas.openxmlformats.org/presentationml/2006/main" show="0">
   <p:cSld>
     <p:spTree>
       <p:nvGrpSpPr>

</xml_diff>